<commit_message>
kotlin advanced - Kotlin - 5 Exceptions note to first slide added
</commit_message>
<xml_diff>
--- a/slides/Kotlin - 5. Exceptions.pptx
+++ b/slides/Kotlin - 5. Exceptions.pptx
@@ -504,6 +504,248 @@
 </file>
 
 <file path=ppt/notesSlides/notesSlide1.xml><?xml version="1.0" encoding="utf-8"?>
+<p:notes xmlns:a="http://schemas.openxmlformats.org/drawingml/2006/main" xmlns:r="http://schemas.openxmlformats.org/officeDocument/2006/relationships" xmlns:p="http://schemas.openxmlformats.org/presentationml/2006/main">
+  <p:cSld>
+    <p:spTree>
+      <p:nvGrpSpPr>
+        <p:cNvPr id="1" name=""/>
+        <p:cNvGrpSpPr/>
+        <p:nvPr/>
+      </p:nvGrpSpPr>
+      <p:grpSpPr>
+        <a:xfrm>
+          <a:off x="0" y="0"/>
+          <a:ext cx="0" cy="0"/>
+          <a:chOff x="0" y="0"/>
+          <a:chExt cx="0" cy="0"/>
+        </a:xfrm>
+      </p:grpSpPr>
+      <p:sp>
+        <p:nvSpPr>
+          <p:cNvPr id="2" name="Zástupný symbol pro obrázek snímku 1"/>
+          <p:cNvSpPr>
+            <a:spLocks noGrp="1" noRot="1" noChangeAspect="1"/>
+          </p:cNvSpPr>
+          <p:nvPr>
+            <p:ph type="sldImg"/>
+          </p:nvPr>
+        </p:nvSpPr>
+        <p:spPr/>
+      </p:sp>
+      <p:sp>
+        <p:nvSpPr>
+          <p:cNvPr id="3" name="Zástupný symbol pro poznámky 2"/>
+          <p:cNvSpPr>
+            <a:spLocks noGrp="1"/>
+          </p:cNvSpPr>
+          <p:nvPr>
+            <p:ph type="body" idx="1"/>
+          </p:nvPr>
+        </p:nvSpPr>
+        <p:spPr/>
+        <p:txBody>
+          <a:bodyPr/>
+          <a:lstStyle/>
+          <a:p>
+            <a:endParaRPr lang="cs-CZ" dirty="0"/>
+          </a:p>
+        </p:txBody>
+      </p:sp>
+      <p:sp>
+        <p:nvSpPr>
+          <p:cNvPr id="4" name="Zástupný symbol pro číslo snímku 3"/>
+          <p:cNvSpPr>
+            <a:spLocks noGrp="1"/>
+          </p:cNvSpPr>
+          <p:nvPr>
+            <p:ph type="sldNum" sz="quarter" idx="10"/>
+          </p:nvPr>
+        </p:nvSpPr>
+        <p:spPr/>
+        <p:txBody>
+          <a:bodyPr/>
+          <a:lstStyle/>
+          <a:p>
+            <a:fld id="{27886F17-B5D0-472B-8745-C3F2BDEA3FAA}" type="slidenum">
+              <a:rPr lang="cs-CZ" smtClean="0"/>
+              <a:pPr/>
+              <a:t>1</a:t>
+            </a:fld>
+            <a:endParaRPr lang="cs-CZ"/>
+          </a:p>
+        </p:txBody>
+      </p:sp>
+    </p:spTree>
+    <p:extLst>
+      <p:ext uri="{BB962C8B-B14F-4D97-AF65-F5344CB8AC3E}">
+        <p14:creationId xmlns:p14="http://schemas.microsoft.com/office/powerpoint/2010/main" val="2991233100"/>
+      </p:ext>
+    </p:extLst>
+  </p:cSld>
+  <p:clrMapOvr>
+    <a:masterClrMapping/>
+  </p:clrMapOvr>
+</p:notes>
+</file>
+
+<file path=ppt/notesSlides/notesSlide2.xml><?xml version="1.0" encoding="utf-8"?>
+<p:notes xmlns:a="http://schemas.openxmlformats.org/drawingml/2006/main" xmlns:r="http://schemas.openxmlformats.org/officeDocument/2006/relationships" xmlns:p="http://schemas.openxmlformats.org/presentationml/2006/main">
+  <p:cSld>
+    <p:spTree>
+      <p:nvGrpSpPr>
+        <p:cNvPr id="1" name=""/>
+        <p:cNvGrpSpPr/>
+        <p:nvPr/>
+      </p:nvGrpSpPr>
+      <p:grpSpPr>
+        <a:xfrm>
+          <a:off x="0" y="0"/>
+          <a:ext cx="0" cy="0"/>
+          <a:chOff x="0" y="0"/>
+          <a:chExt cx="0" cy="0"/>
+        </a:xfrm>
+      </p:grpSpPr>
+      <p:sp>
+        <p:nvSpPr>
+          <p:cNvPr id="2" name="Zástupný symbol pro obrázek snímku 1"/>
+          <p:cNvSpPr>
+            <a:spLocks noGrp="1" noRot="1" noChangeAspect="1"/>
+          </p:cNvSpPr>
+          <p:nvPr>
+            <p:ph type="sldImg"/>
+          </p:nvPr>
+        </p:nvSpPr>
+        <p:spPr/>
+      </p:sp>
+      <p:sp>
+        <p:nvSpPr>
+          <p:cNvPr id="3" name="Zástupný symbol pro poznámky 2"/>
+          <p:cNvSpPr>
+            <a:spLocks noGrp="1"/>
+          </p:cNvSpPr>
+          <p:nvPr>
+            <p:ph type="body" idx="1"/>
+          </p:nvPr>
+        </p:nvSpPr>
+        <p:spPr/>
+        <p:txBody>
+          <a:bodyPr/>
+          <a:lstStyle/>
+          <a:p>
+            <a:r>
+              <a:rPr lang="en-US" sz="1200" b="0" i="0" kern="1200" dirty="0" smtClean="0">
+                <a:solidFill>
+                  <a:schemeClr val="tx1"/>
+                </a:solidFill>
+                <a:effectLst/>
+                <a:latin typeface="+mn-lt"/>
+                <a:ea typeface="+mn-ea"/>
+                <a:cs typeface="+mn-cs"/>
+              </a:rPr>
+              <a:t>The main difference between </a:t>
+            </a:r>
+            <a:r>
+              <a:rPr lang="en-US" sz="1200" b="0" i="0" kern="1200" dirty="0" err="1" smtClean="0">
+                <a:solidFill>
+                  <a:schemeClr val="tx1"/>
+                </a:solidFill>
+                <a:effectLst/>
+                <a:latin typeface="+mn-lt"/>
+                <a:ea typeface="+mn-ea"/>
+                <a:cs typeface="+mn-cs"/>
+              </a:rPr>
+              <a:t>Kotlin</a:t>
+            </a:r>
+            <a:r>
+              <a:rPr lang="en-US" sz="1200" b="0" i="0" kern="1200" dirty="0" smtClean="0">
+                <a:solidFill>
+                  <a:schemeClr val="tx1"/>
+                </a:solidFill>
+                <a:effectLst/>
+                <a:latin typeface="+mn-lt"/>
+                <a:ea typeface="+mn-ea"/>
+                <a:cs typeface="+mn-cs"/>
+              </a:rPr>
+              <a:t> and Java exception mechanisms is that all exceptions are unchecked in </a:t>
+            </a:r>
+            <a:r>
+              <a:rPr lang="en-US" sz="1200" b="0" i="0" kern="1200" dirty="0" err="1" smtClean="0">
+                <a:solidFill>
+                  <a:schemeClr val="tx1"/>
+                </a:solidFill>
+                <a:effectLst/>
+                <a:latin typeface="+mn-lt"/>
+                <a:ea typeface="+mn-ea"/>
+                <a:cs typeface="+mn-cs"/>
+              </a:rPr>
+              <a:t>Kotlin</a:t>
+            </a:r>
+            <a:r>
+              <a:rPr lang="en-US" sz="1200" b="0" i="0" kern="1200" dirty="0" smtClean="0">
+                <a:solidFill>
+                  <a:schemeClr val="tx1"/>
+                </a:solidFill>
+                <a:effectLst/>
+                <a:latin typeface="+mn-lt"/>
+                <a:ea typeface="+mn-ea"/>
+                <a:cs typeface="+mn-cs"/>
+              </a:rPr>
+              <a:t>. </a:t>
+            </a:r>
+            <a:r>
+              <a:rPr lang="en-US" sz="1200" b="0" i="0" kern="1200" smtClean="0">
+                <a:solidFill>
+                  <a:schemeClr val="tx1"/>
+                </a:solidFill>
+                <a:effectLst/>
+                <a:latin typeface="+mn-lt"/>
+                <a:ea typeface="+mn-ea"/>
+                <a:cs typeface="+mn-cs"/>
+              </a:rPr>
+              <a:t>In other words, they are not explicitly declared in the function signatures, as they are in Java.</a:t>
+            </a:r>
+            <a:endParaRPr lang="cs-CZ"/>
+          </a:p>
+        </p:txBody>
+      </p:sp>
+      <p:sp>
+        <p:nvSpPr>
+          <p:cNvPr id="4" name="Zástupný symbol pro číslo snímku 3"/>
+          <p:cNvSpPr>
+            <a:spLocks noGrp="1"/>
+          </p:cNvSpPr>
+          <p:nvPr>
+            <p:ph type="sldNum" sz="quarter" idx="10"/>
+          </p:nvPr>
+        </p:nvSpPr>
+        <p:spPr/>
+        <p:txBody>
+          <a:bodyPr/>
+          <a:lstStyle/>
+          <a:p>
+            <a:fld id="{27886F17-B5D0-472B-8745-C3F2BDEA3FAA}" type="slidenum">
+              <a:rPr lang="cs-CZ" smtClean="0"/>
+              <a:pPr/>
+              <a:t>2</a:t>
+            </a:fld>
+            <a:endParaRPr lang="cs-CZ"/>
+          </a:p>
+        </p:txBody>
+      </p:sp>
+    </p:spTree>
+    <p:extLst>
+      <p:ext uri="{BB962C8B-B14F-4D97-AF65-F5344CB8AC3E}">
+        <p14:creationId xmlns:p14="http://schemas.microsoft.com/office/powerpoint/2010/main" val="4163480064"/>
+      </p:ext>
+    </p:extLst>
+  </p:cSld>
+  <p:clrMapOvr>
+    <a:masterClrMapping/>
+  </p:clrMapOvr>
+</p:notes>
+</file>
+
+<file path=ppt/notesSlides/notesSlide3.xml><?xml version="1.0" encoding="utf-8"?>
 <p:notes xmlns:a="http://schemas.openxmlformats.org/drawingml/2006/main" xmlns:r="http://schemas.openxmlformats.org/officeDocument/2006/relationships" xmlns:p="http://schemas.openxmlformats.org/presentationml/2006/main">
   <p:cSld>
     <p:spTree>

</xml_diff>